<commit_message>
add support of free observer and incremented version to 2.0
</commit_message>
<xml_diff>
--- a/libs/glsu/doc/stereo.pptx
+++ b/libs/glsu/doc/stereo.pptx
@@ -7,8 +7,9 @@
   <p:sldIdLst>
     <p:sldId id="256" r:id="rId2"/>
     <p:sldId id="257" r:id="rId3"/>
-    <p:sldId id="258" r:id="rId4"/>
-    <p:sldId id="259" r:id="rId5"/>
+    <p:sldId id="260" r:id="rId4"/>
+    <p:sldId id="258" r:id="rId5"/>
+    <p:sldId id="259" r:id="rId6"/>
   </p:sldIdLst>
   <p:sldSz cx="9144000" cy="6858000" type="screen4x3"/>
   <p:notesSz cx="6858000" cy="9144000"/>
@@ -292,7 +293,7 @@
             <a:fld id="{23C4AC2C-D31D-4071-8830-CB81F78DE817}" type="datetimeFigureOut">
               <a:rPr lang="de-DE" smtClean="0"/>
               <a:pPr/>
-              <a:t>27.05.2011</a:t>
+              <a:t>21.05.2013</a:t>
             </a:fld>
             <a:endParaRPr lang="de-DE"/>
           </a:p>
@@ -459,7 +460,7 @@
             <a:fld id="{23C4AC2C-D31D-4071-8830-CB81F78DE817}" type="datetimeFigureOut">
               <a:rPr lang="de-DE" smtClean="0"/>
               <a:pPr/>
-              <a:t>27.05.2011</a:t>
+              <a:t>21.05.2013</a:t>
             </a:fld>
             <a:endParaRPr lang="de-DE"/>
           </a:p>
@@ -636,7 +637,7 @@
             <a:fld id="{23C4AC2C-D31D-4071-8830-CB81F78DE817}" type="datetimeFigureOut">
               <a:rPr lang="de-DE" smtClean="0"/>
               <a:pPr/>
-              <a:t>27.05.2011</a:t>
+              <a:t>21.05.2013</a:t>
             </a:fld>
             <a:endParaRPr lang="de-DE"/>
           </a:p>
@@ -803,7 +804,7 @@
             <a:fld id="{23C4AC2C-D31D-4071-8830-CB81F78DE817}" type="datetimeFigureOut">
               <a:rPr lang="de-DE" smtClean="0"/>
               <a:pPr/>
-              <a:t>27.05.2011</a:t>
+              <a:t>21.05.2013</a:t>
             </a:fld>
             <a:endParaRPr lang="de-DE"/>
           </a:p>
@@ -1046,7 +1047,7 @@
             <a:fld id="{23C4AC2C-D31D-4071-8830-CB81F78DE817}" type="datetimeFigureOut">
               <a:rPr lang="de-DE" smtClean="0"/>
               <a:pPr/>
-              <a:t>27.05.2011</a:t>
+              <a:t>21.05.2013</a:t>
             </a:fld>
             <a:endParaRPr lang="de-DE"/>
           </a:p>
@@ -1331,7 +1332,7 @@
             <a:fld id="{23C4AC2C-D31D-4071-8830-CB81F78DE817}" type="datetimeFigureOut">
               <a:rPr lang="de-DE" smtClean="0"/>
               <a:pPr/>
-              <a:t>27.05.2011</a:t>
+              <a:t>21.05.2013</a:t>
             </a:fld>
             <a:endParaRPr lang="de-DE"/>
           </a:p>
@@ -1750,7 +1751,7 @@
             <a:fld id="{23C4AC2C-D31D-4071-8830-CB81F78DE817}" type="datetimeFigureOut">
               <a:rPr lang="de-DE" smtClean="0"/>
               <a:pPr/>
-              <a:t>27.05.2011</a:t>
+              <a:t>21.05.2013</a:t>
             </a:fld>
             <a:endParaRPr lang="de-DE"/>
           </a:p>
@@ -1865,7 +1866,7 @@
             <a:fld id="{23C4AC2C-D31D-4071-8830-CB81F78DE817}" type="datetimeFigureOut">
               <a:rPr lang="de-DE" smtClean="0"/>
               <a:pPr/>
-              <a:t>27.05.2011</a:t>
+              <a:t>21.05.2013</a:t>
             </a:fld>
             <a:endParaRPr lang="de-DE"/>
           </a:p>
@@ -1957,7 +1958,7 @@
             <a:fld id="{23C4AC2C-D31D-4071-8830-CB81F78DE817}" type="datetimeFigureOut">
               <a:rPr lang="de-DE" smtClean="0"/>
               <a:pPr/>
-              <a:t>27.05.2011</a:t>
+              <a:t>21.05.2013</a:t>
             </a:fld>
             <a:endParaRPr lang="de-DE"/>
           </a:p>
@@ -2231,7 +2232,7 @@
             <a:fld id="{23C4AC2C-D31D-4071-8830-CB81F78DE817}" type="datetimeFigureOut">
               <a:rPr lang="de-DE" smtClean="0"/>
               <a:pPr/>
-              <a:t>27.05.2011</a:t>
+              <a:t>21.05.2013</a:t>
             </a:fld>
             <a:endParaRPr lang="de-DE"/>
           </a:p>
@@ -2481,7 +2482,7 @@
             <a:fld id="{23C4AC2C-D31D-4071-8830-CB81F78DE817}" type="datetimeFigureOut">
               <a:rPr lang="de-DE" smtClean="0"/>
               <a:pPr/>
-              <a:t>27.05.2011</a:t>
+              <a:t>21.05.2013</a:t>
             </a:fld>
             <a:endParaRPr lang="de-DE"/>
           </a:p>
@@ -2691,7 +2692,7 @@
             <a:fld id="{23C4AC2C-D31D-4071-8830-CB81F78DE817}" type="datetimeFigureOut">
               <a:rPr lang="de-DE" smtClean="0"/>
               <a:pPr/>
-              <a:t>27.05.2011</a:t>
+              <a:t>21.05.2013</a:t>
             </a:fld>
             <a:endParaRPr lang="de-DE"/>
           </a:p>
@@ -5186,6 +5187,1833 @@
           <a:chExt cx="0" cy="0"/>
         </a:xfrm>
       </p:grpSpPr>
+      <p:cxnSp>
+        <p:nvCxnSpPr>
+          <p:cNvPr id="7" name="Gerade Verbindung 6"/>
+          <p:cNvCxnSpPr/>
+          <p:nvPr/>
+        </p:nvCxnSpPr>
+        <p:spPr>
+          <a:xfrm>
+            <a:off x="2843808" y="3429000"/>
+            <a:ext cx="3600400" cy="0"/>
+          </a:xfrm>
+          <a:prstGeom prst="line">
+            <a:avLst/>
+          </a:prstGeom>
+          <a:ln w="57150">
+            <a:solidFill>
+              <a:schemeClr val="bg1">
+                <a:lumMod val="50000"/>
+              </a:schemeClr>
+            </a:solidFill>
+          </a:ln>
+        </p:spPr>
+        <p:style>
+          <a:lnRef idx="1">
+            <a:schemeClr val="accent1"/>
+          </a:lnRef>
+          <a:fillRef idx="0">
+            <a:schemeClr val="accent1"/>
+          </a:fillRef>
+          <a:effectRef idx="0">
+            <a:schemeClr val="accent1"/>
+          </a:effectRef>
+          <a:fontRef idx="minor">
+            <a:schemeClr val="tx1"/>
+          </a:fontRef>
+        </p:style>
+      </p:cxnSp>
+      <p:cxnSp>
+        <p:nvCxnSpPr>
+          <p:cNvPr id="11" name="Gerade Verbindung 10"/>
+          <p:cNvCxnSpPr/>
+          <p:nvPr/>
+        </p:nvCxnSpPr>
+        <p:spPr>
+          <a:xfrm>
+            <a:off x="2271713" y="2586038"/>
+            <a:ext cx="1169828" cy="1711642"/>
+          </a:xfrm>
+          <a:prstGeom prst="line">
+            <a:avLst/>
+          </a:prstGeom>
+          <a:ln w="19050">
+            <a:solidFill>
+              <a:schemeClr val="tx1">
+                <a:lumMod val="50000"/>
+                <a:lumOff val="50000"/>
+              </a:schemeClr>
+            </a:solidFill>
+          </a:ln>
+        </p:spPr>
+        <p:style>
+          <a:lnRef idx="1">
+            <a:schemeClr val="accent1"/>
+          </a:lnRef>
+          <a:fillRef idx="0">
+            <a:schemeClr val="accent1"/>
+          </a:fillRef>
+          <a:effectRef idx="0">
+            <a:schemeClr val="accent1"/>
+          </a:effectRef>
+          <a:fontRef idx="minor">
+            <a:schemeClr val="tx1"/>
+          </a:fontRef>
+        </p:style>
+      </p:cxnSp>
+      <p:cxnSp>
+        <p:nvCxnSpPr>
+          <p:cNvPr id="12" name="Gerade Verbindung 11"/>
+          <p:cNvCxnSpPr/>
+          <p:nvPr/>
+        </p:nvCxnSpPr>
+        <p:spPr>
+          <a:xfrm flipV="1">
+            <a:off x="5289535" y="2537460"/>
+            <a:ext cx="2284745" cy="1757113"/>
+          </a:xfrm>
+          <a:prstGeom prst="line">
+            <a:avLst/>
+          </a:prstGeom>
+          <a:ln w="19050">
+            <a:solidFill>
+              <a:schemeClr val="tx1">
+                <a:lumMod val="50000"/>
+                <a:lumOff val="50000"/>
+              </a:schemeClr>
+            </a:solidFill>
+          </a:ln>
+        </p:spPr>
+        <p:style>
+          <a:lnRef idx="1">
+            <a:schemeClr val="accent1"/>
+          </a:lnRef>
+          <a:fillRef idx="0">
+            <a:schemeClr val="accent1"/>
+          </a:fillRef>
+          <a:effectRef idx="0">
+            <a:schemeClr val="accent1"/>
+          </a:effectRef>
+          <a:fontRef idx="minor">
+            <a:schemeClr val="tx1"/>
+          </a:fontRef>
+        </p:style>
+      </p:cxnSp>
+      <p:cxnSp>
+        <p:nvCxnSpPr>
+          <p:cNvPr id="15" name="Gerade Verbindung 14"/>
+          <p:cNvCxnSpPr/>
+          <p:nvPr/>
+        </p:nvCxnSpPr>
+        <p:spPr>
+          <a:xfrm>
+            <a:off x="2271713" y="2564904"/>
+            <a:ext cx="5302567" cy="0"/>
+          </a:xfrm>
+          <a:prstGeom prst="line">
+            <a:avLst/>
+          </a:prstGeom>
+          <a:ln w="19050">
+            <a:solidFill>
+              <a:schemeClr val="tx1">
+                <a:lumMod val="50000"/>
+                <a:lumOff val="50000"/>
+              </a:schemeClr>
+            </a:solidFill>
+          </a:ln>
+        </p:spPr>
+        <p:style>
+          <a:lnRef idx="1">
+            <a:schemeClr val="accent1"/>
+          </a:lnRef>
+          <a:fillRef idx="0">
+            <a:schemeClr val="accent1"/>
+          </a:fillRef>
+          <a:effectRef idx="0">
+            <a:schemeClr val="accent1"/>
+          </a:effectRef>
+          <a:fontRef idx="minor">
+            <a:schemeClr val="tx1"/>
+          </a:fontRef>
+        </p:style>
+      </p:cxnSp>
+      <p:cxnSp>
+        <p:nvCxnSpPr>
+          <p:cNvPr id="22" name="Gerade Verbindung mit Pfeil 21"/>
+          <p:cNvCxnSpPr/>
+          <p:nvPr/>
+        </p:nvCxnSpPr>
+        <p:spPr>
+          <a:xfrm flipV="1">
+            <a:off x="6371406" y="4293096"/>
+            <a:ext cx="0" cy="719286"/>
+          </a:xfrm>
+          <a:prstGeom prst="straightConnector1">
+            <a:avLst/>
+          </a:prstGeom>
+          <a:ln w="19050">
+            <a:solidFill>
+              <a:schemeClr val="tx1"/>
+            </a:solidFill>
+            <a:headEnd type="arrow" w="med" len="med"/>
+            <a:tailEnd type="arrow" w="med" len="med"/>
+          </a:ln>
+        </p:spPr>
+        <p:style>
+          <a:lnRef idx="1">
+            <a:schemeClr val="accent1"/>
+          </a:lnRef>
+          <a:fillRef idx="0">
+            <a:schemeClr val="accent1"/>
+          </a:fillRef>
+          <a:effectRef idx="0">
+            <a:schemeClr val="accent1"/>
+          </a:effectRef>
+          <a:fontRef idx="minor">
+            <a:schemeClr val="tx1"/>
+          </a:fontRef>
+        </p:style>
+      </p:cxnSp>
+      <p:cxnSp>
+        <p:nvCxnSpPr>
+          <p:cNvPr id="26" name="Gerade Verbindung mit Pfeil 25"/>
+          <p:cNvCxnSpPr/>
+          <p:nvPr/>
+        </p:nvCxnSpPr>
+        <p:spPr>
+          <a:xfrm flipV="1">
+            <a:off x="6858654" y="2546974"/>
+            <a:ext cx="0" cy="2466202"/>
+          </a:xfrm>
+          <a:prstGeom prst="straightConnector1">
+            <a:avLst/>
+          </a:prstGeom>
+          <a:ln w="19050">
+            <a:solidFill>
+              <a:schemeClr val="tx1"/>
+            </a:solidFill>
+            <a:headEnd type="arrow" w="med" len="med"/>
+            <a:tailEnd type="arrow" w="med" len="med"/>
+          </a:ln>
+        </p:spPr>
+        <p:style>
+          <a:lnRef idx="1">
+            <a:schemeClr val="accent1"/>
+          </a:lnRef>
+          <a:fillRef idx="0">
+            <a:schemeClr val="accent1"/>
+          </a:fillRef>
+          <a:effectRef idx="0">
+            <a:schemeClr val="accent1"/>
+          </a:effectRef>
+          <a:fontRef idx="minor">
+            <a:schemeClr val="tx1"/>
+          </a:fontRef>
+        </p:style>
+      </p:cxnSp>
+      <p:cxnSp>
+        <p:nvCxnSpPr>
+          <p:cNvPr id="45" name="Gerade Verbindung 44"/>
+          <p:cNvCxnSpPr/>
+          <p:nvPr/>
+        </p:nvCxnSpPr>
+        <p:spPr>
+          <a:xfrm>
+            <a:off x="3779912" y="5013176"/>
+            <a:ext cx="3078742" cy="0"/>
+          </a:xfrm>
+          <a:prstGeom prst="line">
+            <a:avLst/>
+          </a:prstGeom>
+          <a:ln w="12700">
+            <a:solidFill>
+              <a:schemeClr val="tx1"/>
+            </a:solidFill>
+            <a:prstDash val="dash"/>
+          </a:ln>
+        </p:spPr>
+        <p:style>
+          <a:lnRef idx="1">
+            <a:schemeClr val="accent1"/>
+          </a:lnRef>
+          <a:fillRef idx="0">
+            <a:schemeClr val="accent1"/>
+          </a:fillRef>
+          <a:effectRef idx="0">
+            <a:schemeClr val="accent1"/>
+          </a:effectRef>
+          <a:fontRef idx="minor">
+            <a:schemeClr val="tx1"/>
+          </a:fontRef>
+        </p:style>
+      </p:cxnSp>
+      <p:cxnSp>
+        <p:nvCxnSpPr>
+          <p:cNvPr id="65" name="Gerade Verbindung 64"/>
+          <p:cNvCxnSpPr/>
+          <p:nvPr/>
+        </p:nvCxnSpPr>
+        <p:spPr>
+          <a:xfrm>
+            <a:off x="2400300" y="2581275"/>
+            <a:ext cx="889150" cy="1691715"/>
+          </a:xfrm>
+          <a:prstGeom prst="line">
+            <a:avLst/>
+          </a:prstGeom>
+          <a:ln w="19050">
+            <a:solidFill>
+              <a:srgbClr val="FF0000"/>
+            </a:solidFill>
+            <a:prstDash val="dash"/>
+          </a:ln>
+        </p:spPr>
+        <p:style>
+          <a:lnRef idx="1">
+            <a:schemeClr val="accent1"/>
+          </a:lnRef>
+          <a:fillRef idx="0">
+            <a:schemeClr val="accent1"/>
+          </a:fillRef>
+          <a:effectRef idx="0">
+            <a:schemeClr val="accent1"/>
+          </a:effectRef>
+          <a:fontRef idx="minor">
+            <a:schemeClr val="tx1"/>
+          </a:fontRef>
+        </p:style>
+      </p:cxnSp>
+      <p:cxnSp>
+        <p:nvCxnSpPr>
+          <p:cNvPr id="68" name="Gerade Verbindung 67"/>
+          <p:cNvCxnSpPr/>
+          <p:nvPr/>
+        </p:nvCxnSpPr>
+        <p:spPr>
+          <a:xfrm flipH="1">
+            <a:off x="5616919" y="2552700"/>
+            <a:ext cx="1652562" cy="1720290"/>
+          </a:xfrm>
+          <a:prstGeom prst="line">
+            <a:avLst/>
+          </a:prstGeom>
+          <a:ln w="19050">
+            <a:solidFill>
+              <a:srgbClr val="3333FF"/>
+            </a:solidFill>
+            <a:prstDash val="dashDot"/>
+          </a:ln>
+        </p:spPr>
+        <p:style>
+          <a:lnRef idx="1">
+            <a:schemeClr val="accent1"/>
+          </a:lnRef>
+          <a:fillRef idx="0">
+            <a:schemeClr val="accent1"/>
+          </a:fillRef>
+          <a:effectRef idx="0">
+            <a:schemeClr val="accent1"/>
+          </a:effectRef>
+          <a:fontRef idx="minor">
+            <a:schemeClr val="tx1"/>
+          </a:fontRef>
+        </p:style>
+      </p:cxnSp>
+      <p:cxnSp>
+        <p:nvCxnSpPr>
+          <p:cNvPr id="69" name="Gerade Verbindung 68"/>
+          <p:cNvCxnSpPr/>
+          <p:nvPr/>
+        </p:nvCxnSpPr>
+        <p:spPr>
+          <a:xfrm>
+            <a:off x="2178547" y="2582834"/>
+            <a:ext cx="1362288" cy="1714846"/>
+          </a:xfrm>
+          <a:prstGeom prst="line">
+            <a:avLst/>
+          </a:prstGeom>
+          <a:ln w="19050">
+            <a:solidFill>
+              <a:srgbClr val="3333FF"/>
+            </a:solidFill>
+            <a:prstDash val="dashDot"/>
+          </a:ln>
+        </p:spPr>
+        <p:style>
+          <a:lnRef idx="1">
+            <a:schemeClr val="accent1"/>
+          </a:lnRef>
+          <a:fillRef idx="0">
+            <a:schemeClr val="accent1"/>
+          </a:fillRef>
+          <a:effectRef idx="0">
+            <a:schemeClr val="accent1"/>
+          </a:effectRef>
+          <a:fontRef idx="minor">
+            <a:schemeClr val="tx1"/>
+          </a:fontRef>
+        </p:style>
+      </p:cxnSp>
+      <p:cxnSp>
+        <p:nvCxnSpPr>
+          <p:cNvPr id="72" name="Gerade Verbindung 71"/>
+          <p:cNvCxnSpPr/>
+          <p:nvPr/>
+        </p:nvCxnSpPr>
+        <p:spPr>
+          <a:xfrm flipH="1">
+            <a:off x="4907280" y="2545080"/>
+            <a:ext cx="3032762" cy="1743873"/>
+          </a:xfrm>
+          <a:prstGeom prst="line">
+            <a:avLst/>
+          </a:prstGeom>
+          <a:ln w="19050">
+            <a:solidFill>
+              <a:srgbClr val="FF0000"/>
+            </a:solidFill>
+            <a:prstDash val="dash"/>
+          </a:ln>
+        </p:spPr>
+        <p:style>
+          <a:lnRef idx="1">
+            <a:schemeClr val="accent1"/>
+          </a:lnRef>
+          <a:fillRef idx="0">
+            <a:schemeClr val="accent1"/>
+          </a:fillRef>
+          <a:effectRef idx="0">
+            <a:schemeClr val="accent1"/>
+          </a:effectRef>
+          <a:fontRef idx="minor">
+            <a:schemeClr val="tx1"/>
+          </a:fontRef>
+        </p:style>
+      </p:cxnSp>
+      <p:cxnSp>
+        <p:nvCxnSpPr>
+          <p:cNvPr id="73" name="Gerade Verbindung 72"/>
+          <p:cNvCxnSpPr/>
+          <p:nvPr/>
+        </p:nvCxnSpPr>
+        <p:spPr>
+          <a:xfrm>
+            <a:off x="2195736" y="2582834"/>
+            <a:ext cx="5073744" cy="0"/>
+          </a:xfrm>
+          <a:prstGeom prst="line">
+            <a:avLst/>
+          </a:prstGeom>
+          <a:ln w="19050">
+            <a:solidFill>
+              <a:srgbClr val="3333FF"/>
+            </a:solidFill>
+            <a:prstDash val="dashDot"/>
+          </a:ln>
+        </p:spPr>
+        <p:style>
+          <a:lnRef idx="1">
+            <a:schemeClr val="accent1"/>
+          </a:lnRef>
+          <a:fillRef idx="0">
+            <a:schemeClr val="accent1"/>
+          </a:fillRef>
+          <a:effectRef idx="0">
+            <a:schemeClr val="accent1"/>
+          </a:effectRef>
+          <a:fontRef idx="minor">
+            <a:schemeClr val="tx1"/>
+          </a:fontRef>
+        </p:style>
+      </p:cxnSp>
+      <p:cxnSp>
+        <p:nvCxnSpPr>
+          <p:cNvPr id="74" name="Gerade Verbindung 73"/>
+          <p:cNvCxnSpPr/>
+          <p:nvPr/>
+        </p:nvCxnSpPr>
+        <p:spPr>
+          <a:xfrm>
+            <a:off x="2339752" y="2546974"/>
+            <a:ext cx="5600288" cy="0"/>
+          </a:xfrm>
+          <a:prstGeom prst="line">
+            <a:avLst/>
+          </a:prstGeom>
+          <a:ln w="19050">
+            <a:solidFill>
+              <a:srgbClr val="FF0000"/>
+            </a:solidFill>
+            <a:prstDash val="dash"/>
+          </a:ln>
+        </p:spPr>
+        <p:style>
+          <a:lnRef idx="1">
+            <a:schemeClr val="accent1"/>
+          </a:lnRef>
+          <a:fillRef idx="0">
+            <a:schemeClr val="accent1"/>
+          </a:fillRef>
+          <a:effectRef idx="0">
+            <a:schemeClr val="accent1"/>
+          </a:effectRef>
+          <a:fontRef idx="minor">
+            <a:schemeClr val="tx1"/>
+          </a:fontRef>
+        </p:style>
+      </p:cxnSp>
+      <p:cxnSp>
+        <p:nvCxnSpPr>
+          <p:cNvPr id="79" name="Gerade Verbindung 78"/>
+          <p:cNvCxnSpPr/>
+          <p:nvPr/>
+        </p:nvCxnSpPr>
+        <p:spPr>
+          <a:xfrm>
+            <a:off x="3300809" y="4271187"/>
+            <a:ext cx="1636951" cy="0"/>
+          </a:xfrm>
+          <a:prstGeom prst="line">
+            <a:avLst/>
+          </a:prstGeom>
+          <a:ln w="19050">
+            <a:solidFill>
+              <a:srgbClr val="FF0000"/>
+            </a:solidFill>
+            <a:prstDash val="dash"/>
+          </a:ln>
+        </p:spPr>
+        <p:style>
+          <a:lnRef idx="1">
+            <a:schemeClr val="accent1"/>
+          </a:lnRef>
+          <a:fillRef idx="0">
+            <a:schemeClr val="accent1"/>
+          </a:fillRef>
+          <a:effectRef idx="0">
+            <a:schemeClr val="accent1"/>
+          </a:effectRef>
+          <a:fontRef idx="minor">
+            <a:schemeClr val="tx1"/>
+          </a:fontRef>
+        </p:style>
+      </p:cxnSp>
+      <p:cxnSp>
+        <p:nvCxnSpPr>
+          <p:cNvPr id="92" name="Gerade Verbindung 91"/>
+          <p:cNvCxnSpPr/>
+          <p:nvPr/>
+        </p:nvCxnSpPr>
+        <p:spPr>
+          <a:xfrm>
+            <a:off x="3599478" y="4308336"/>
+            <a:ext cx="2017441" cy="0"/>
+          </a:xfrm>
+          <a:prstGeom prst="line">
+            <a:avLst/>
+          </a:prstGeom>
+          <a:ln w="19050">
+            <a:solidFill>
+              <a:srgbClr val="3333FF"/>
+            </a:solidFill>
+            <a:prstDash val="dashDot"/>
+          </a:ln>
+        </p:spPr>
+        <p:style>
+          <a:lnRef idx="1">
+            <a:schemeClr val="accent1"/>
+          </a:lnRef>
+          <a:fillRef idx="0">
+            <a:schemeClr val="accent1"/>
+          </a:fillRef>
+          <a:effectRef idx="0">
+            <a:schemeClr val="accent1"/>
+          </a:effectRef>
+          <a:fontRef idx="minor">
+            <a:schemeClr val="tx1"/>
+          </a:fontRef>
+        </p:style>
+      </p:cxnSp>
+      <p:cxnSp>
+        <p:nvCxnSpPr>
+          <p:cNvPr id="93" name="Gerade Verbindung mit Pfeil 92"/>
+          <p:cNvCxnSpPr/>
+          <p:nvPr/>
+        </p:nvCxnSpPr>
+        <p:spPr>
+          <a:xfrm rot="10800000">
+            <a:off x="2843808" y="3212976"/>
+            <a:ext cx="3600400" cy="1588"/>
+          </a:xfrm>
+          <a:prstGeom prst="straightConnector1">
+            <a:avLst/>
+          </a:prstGeom>
+          <a:ln w="19050">
+            <a:solidFill>
+              <a:schemeClr val="tx1"/>
+            </a:solidFill>
+            <a:headEnd type="arrow" w="med" len="med"/>
+            <a:tailEnd type="arrow" w="med" len="med"/>
+          </a:ln>
+        </p:spPr>
+        <p:style>
+          <a:lnRef idx="1">
+            <a:schemeClr val="accent1"/>
+          </a:lnRef>
+          <a:fillRef idx="0">
+            <a:schemeClr val="accent1"/>
+          </a:fillRef>
+          <a:effectRef idx="0">
+            <a:schemeClr val="accent1"/>
+          </a:effectRef>
+          <a:fontRef idx="minor">
+            <a:schemeClr val="tx1"/>
+          </a:fontRef>
+        </p:style>
+      </p:cxnSp>
+      <p:sp>
+        <p:nvSpPr>
+          <p:cNvPr id="95" name="Textfeld 94"/>
+          <p:cNvSpPr txBox="1"/>
+          <p:nvPr/>
+        </p:nvSpPr>
+        <p:spPr>
+          <a:xfrm>
+            <a:off x="3779912" y="2843644"/>
+            <a:ext cx="1701107" cy="369332"/>
+          </a:xfrm>
+          <a:prstGeom prst="rect">
+            <a:avLst/>
+          </a:prstGeom>
+          <a:noFill/>
+        </p:spPr>
+        <p:txBody>
+          <a:bodyPr wrap="none" rtlCol="0">
+            <a:spAutoFit/>
+          </a:bodyPr>
+          <a:lstStyle/>
+          <a:p>
+            <a:r>
+              <a:rPr lang="de-DE" dirty="0" err="1" smtClean="0">
+                <a:latin typeface="Courier New" pitchFamily="49" charset="0"/>
+                <a:cs typeface="Courier New" pitchFamily="49" charset="0"/>
+              </a:rPr>
+              <a:t>screenWidth</a:t>
+            </a:r>
+            <a:endParaRPr lang="de-DE" dirty="0">
+              <a:latin typeface="Courier New" pitchFamily="49" charset="0"/>
+              <a:cs typeface="Courier New" pitchFamily="49" charset="0"/>
+            </a:endParaRPr>
+          </a:p>
+        </p:txBody>
+      </p:sp>
+      <p:sp>
+        <p:nvSpPr>
+          <p:cNvPr id="96" name="Textfeld 95"/>
+          <p:cNvSpPr txBox="1"/>
+          <p:nvPr/>
+        </p:nvSpPr>
+        <p:spPr>
+          <a:xfrm rot="5400000">
+            <a:off x="6102128" y="4455072"/>
+            <a:ext cx="873957" cy="369332"/>
+          </a:xfrm>
+          <a:prstGeom prst="rect">
+            <a:avLst/>
+          </a:prstGeom>
+          <a:noFill/>
+        </p:spPr>
+        <p:txBody>
+          <a:bodyPr wrap="none" rtlCol="0">
+            <a:spAutoFit/>
+          </a:bodyPr>
+          <a:lstStyle/>
+          <a:p>
+            <a:r>
+              <a:rPr lang="de-DE" dirty="0" err="1" smtClean="0">
+                <a:latin typeface="Courier New" pitchFamily="49" charset="0"/>
+                <a:cs typeface="Courier New" pitchFamily="49" charset="0"/>
+              </a:rPr>
+              <a:t>zNear</a:t>
+            </a:r>
+            <a:endParaRPr lang="de-DE" dirty="0">
+              <a:latin typeface="Courier New" pitchFamily="49" charset="0"/>
+              <a:cs typeface="Courier New" pitchFamily="49" charset="0"/>
+            </a:endParaRPr>
+          </a:p>
+        </p:txBody>
+      </p:sp>
+      <p:sp>
+        <p:nvSpPr>
+          <p:cNvPr id="97" name="Textfeld 96"/>
+          <p:cNvSpPr txBox="1"/>
+          <p:nvPr/>
+        </p:nvSpPr>
+        <p:spPr>
+          <a:xfrm rot="5400000">
+            <a:off x="6620865" y="4359359"/>
+            <a:ext cx="736099" cy="369332"/>
+          </a:xfrm>
+          <a:prstGeom prst="rect">
+            <a:avLst/>
+          </a:prstGeom>
+          <a:noFill/>
+        </p:spPr>
+        <p:txBody>
+          <a:bodyPr wrap="none" rtlCol="0">
+            <a:spAutoFit/>
+          </a:bodyPr>
+          <a:lstStyle/>
+          <a:p>
+            <a:r>
+              <a:rPr lang="de-DE" dirty="0" err="1" smtClean="0">
+                <a:latin typeface="Courier New" pitchFamily="49" charset="0"/>
+                <a:cs typeface="Courier New" pitchFamily="49" charset="0"/>
+              </a:rPr>
+              <a:t>zFar</a:t>
+            </a:r>
+            <a:endParaRPr lang="de-DE" dirty="0">
+              <a:latin typeface="Courier New" pitchFamily="49" charset="0"/>
+              <a:cs typeface="Courier New" pitchFamily="49" charset="0"/>
+            </a:endParaRPr>
+          </a:p>
+        </p:txBody>
+      </p:sp>
+      <p:sp>
+        <p:nvSpPr>
+          <p:cNvPr id="99" name="Textfeld 98"/>
+          <p:cNvSpPr txBox="1"/>
+          <p:nvPr/>
+        </p:nvSpPr>
+        <p:spPr>
+          <a:xfrm rot="16200000">
+            <a:off x="2093597" y="4317214"/>
+            <a:ext cx="1149674" cy="369332"/>
+          </a:xfrm>
+          <a:prstGeom prst="rect">
+            <a:avLst/>
+          </a:prstGeom>
+          <a:noFill/>
+        </p:spPr>
+        <p:txBody>
+          <a:bodyPr wrap="none" rtlCol="0">
+            <a:spAutoFit/>
+          </a:bodyPr>
+          <a:lstStyle/>
+          <a:p>
+            <a:r>
+              <a:rPr lang="de-DE" b="1" dirty="0" err="1" smtClean="0">
+                <a:solidFill>
+                  <a:schemeClr val="accent6">
+                    <a:lumMod val="75000"/>
+                  </a:schemeClr>
+                </a:solidFill>
+                <a:latin typeface="Courier New" pitchFamily="49" charset="0"/>
+                <a:cs typeface="Courier New" pitchFamily="49" charset="0"/>
+              </a:rPr>
+              <a:t>viewDir</a:t>
+            </a:r>
+            <a:endParaRPr lang="de-DE" b="1" dirty="0">
+              <a:solidFill>
+                <a:schemeClr val="accent6">
+                  <a:lumMod val="75000"/>
+                </a:schemeClr>
+              </a:solidFill>
+              <a:latin typeface="Courier New" pitchFamily="49" charset="0"/>
+              <a:cs typeface="Courier New" pitchFamily="49" charset="0"/>
+            </a:endParaRPr>
+          </a:p>
+        </p:txBody>
+      </p:sp>
+      <p:sp>
+        <p:nvSpPr>
+          <p:cNvPr id="102" name="Textfeld 101"/>
+          <p:cNvSpPr txBox="1"/>
+          <p:nvPr/>
+        </p:nvSpPr>
+        <p:spPr>
+          <a:xfrm>
+            <a:off x="4355976" y="5507940"/>
+            <a:ext cx="3631122" cy="369332"/>
+          </a:xfrm>
+          <a:prstGeom prst="rect">
+            <a:avLst/>
+          </a:prstGeom>
+          <a:noFill/>
+        </p:spPr>
+        <p:txBody>
+          <a:bodyPr wrap="none" rtlCol="0">
+            <a:spAutoFit/>
+          </a:bodyPr>
+          <a:lstStyle/>
+          <a:p>
+            <a:r>
+              <a:rPr lang="de-DE" dirty="0" err="1" smtClean="0">
+                <a:latin typeface="Courier New" pitchFamily="49" charset="0"/>
+                <a:cs typeface="Courier New" pitchFamily="49" charset="0"/>
+              </a:rPr>
+              <a:t>eyeSeparation</a:t>
+            </a:r>
+            <a:r>
+              <a:rPr lang="de-DE" dirty="0" smtClean="0">
+                <a:latin typeface="Courier New" pitchFamily="49" charset="0"/>
+                <a:cs typeface="Courier New" pitchFamily="49" charset="0"/>
+              </a:rPr>
+              <a:t>*</a:t>
+            </a:r>
+            <a:r>
+              <a:rPr lang="de-DE" dirty="0" err="1" smtClean="0">
+                <a:latin typeface="Courier New" pitchFamily="49" charset="0"/>
+                <a:cs typeface="Courier New" pitchFamily="49" charset="0"/>
+              </a:rPr>
+              <a:t>screenWidth</a:t>
+            </a:r>
+            <a:endParaRPr lang="de-DE" dirty="0">
+              <a:latin typeface="Courier New" pitchFamily="49" charset="0"/>
+              <a:cs typeface="Courier New" pitchFamily="49" charset="0"/>
+            </a:endParaRPr>
+          </a:p>
+        </p:txBody>
+      </p:sp>
+      <p:sp>
+        <p:nvSpPr>
+          <p:cNvPr id="14" name="Rechteck 13"/>
+          <p:cNvSpPr/>
+          <p:nvPr/>
+        </p:nvSpPr>
+        <p:spPr>
+          <a:xfrm>
+            <a:off x="4572000" y="5219908"/>
+            <a:ext cx="3217547" cy="369332"/>
+          </a:xfrm>
+          <a:prstGeom prst="rect">
+            <a:avLst/>
+          </a:prstGeom>
+        </p:spPr>
+        <p:txBody>
+          <a:bodyPr wrap="none">
+            <a:spAutoFit/>
+          </a:bodyPr>
+          <a:lstStyle/>
+          <a:p>
+            <a:r>
+              <a:rPr lang="de-DE" b="1" dirty="0" err="1" smtClean="0">
+                <a:solidFill>
+                  <a:schemeClr val="accent4"/>
+                </a:solidFill>
+                <a:latin typeface="Courier New" pitchFamily="49" charset="0"/>
+                <a:cs typeface="Courier New" pitchFamily="49" charset="0"/>
+              </a:rPr>
+              <a:t>eyeSeparationDirection</a:t>
+            </a:r>
+            <a:endParaRPr lang="en-US" b="1" dirty="0">
+              <a:solidFill>
+                <a:schemeClr val="accent4"/>
+              </a:solidFill>
+            </a:endParaRPr>
+          </a:p>
+        </p:txBody>
+      </p:sp>
+      <p:sp>
+        <p:nvSpPr>
+          <p:cNvPr id="16" name="Rechteck 15"/>
+          <p:cNvSpPr/>
+          <p:nvPr/>
+        </p:nvSpPr>
+        <p:spPr>
+          <a:xfrm>
+            <a:off x="1661428" y="5291916"/>
+            <a:ext cx="2390398" cy="369332"/>
+          </a:xfrm>
+          <a:prstGeom prst="rect">
+            <a:avLst/>
+          </a:prstGeom>
+        </p:spPr>
+        <p:txBody>
+          <a:bodyPr wrap="none">
+            <a:spAutoFit/>
+          </a:bodyPr>
+          <a:lstStyle/>
+          <a:p>
+            <a:r>
+              <a:rPr lang="de-DE" b="1" dirty="0" err="1" smtClean="0">
+                <a:solidFill>
+                  <a:schemeClr val="tx1">
+                    <a:lumMod val="50000"/>
+                    <a:lumOff val="50000"/>
+                  </a:schemeClr>
+                </a:solidFill>
+                <a:latin typeface="Courier New" pitchFamily="49" charset="0"/>
+                <a:cs typeface="Courier New" pitchFamily="49" charset="0"/>
+              </a:rPr>
+              <a:t>observerLocation</a:t>
+            </a:r>
+            <a:endParaRPr lang="en-US" b="1" dirty="0">
+              <a:solidFill>
+                <a:schemeClr val="tx1">
+                  <a:lumMod val="50000"/>
+                  <a:lumOff val="50000"/>
+                </a:schemeClr>
+              </a:solidFill>
+            </a:endParaRPr>
+          </a:p>
+        </p:txBody>
+      </p:sp>
+      <p:cxnSp>
+        <p:nvCxnSpPr>
+          <p:cNvPr id="57" name="Gerade Verbindung mit Pfeil 56"/>
+          <p:cNvCxnSpPr/>
+          <p:nvPr/>
+        </p:nvCxnSpPr>
+        <p:spPr>
+          <a:xfrm>
+            <a:off x="4655289" y="3443560"/>
+            <a:ext cx="825730" cy="0"/>
+          </a:xfrm>
+          <a:prstGeom prst="straightConnector1">
+            <a:avLst/>
+          </a:prstGeom>
+          <a:ln w="38100">
+            <a:solidFill>
+              <a:srgbClr val="00B050"/>
+            </a:solidFill>
+            <a:headEnd type="none" w="med" len="med"/>
+            <a:tailEnd type="arrow" w="sm" len="sm"/>
+          </a:ln>
+        </p:spPr>
+        <p:style>
+          <a:lnRef idx="1">
+            <a:schemeClr val="accent1"/>
+          </a:lnRef>
+          <a:fillRef idx="0">
+            <a:schemeClr val="accent1"/>
+          </a:fillRef>
+          <a:effectRef idx="0">
+            <a:schemeClr val="accent1"/>
+          </a:effectRef>
+          <a:fontRef idx="minor">
+            <a:schemeClr val="tx1"/>
+          </a:fontRef>
+        </p:style>
+      </p:cxnSp>
+      <p:sp>
+        <p:nvSpPr>
+          <p:cNvPr id="60" name="Textfeld 59"/>
+          <p:cNvSpPr txBox="1"/>
+          <p:nvPr/>
+        </p:nvSpPr>
+        <p:spPr>
+          <a:xfrm>
+            <a:off x="5294395" y="3443560"/>
+            <a:ext cx="322524" cy="369332"/>
+          </a:xfrm>
+          <a:prstGeom prst="rect">
+            <a:avLst/>
+          </a:prstGeom>
+          <a:noFill/>
+        </p:spPr>
+        <p:txBody>
+          <a:bodyPr wrap="none" rtlCol="0">
+            <a:spAutoFit/>
+          </a:bodyPr>
+          <a:lstStyle/>
+          <a:p>
+            <a:r>
+              <a:rPr lang="de-DE" dirty="0" smtClean="0">
+                <a:solidFill>
+                  <a:srgbClr val="00B050"/>
+                </a:solidFill>
+                <a:latin typeface="Courier New" pitchFamily="49" charset="0"/>
+                <a:cs typeface="Courier New" pitchFamily="49" charset="0"/>
+              </a:rPr>
+              <a:t>x</a:t>
+            </a:r>
+            <a:endParaRPr lang="de-DE" dirty="0">
+              <a:solidFill>
+                <a:srgbClr val="00B050"/>
+              </a:solidFill>
+              <a:latin typeface="Courier New" pitchFamily="49" charset="0"/>
+              <a:cs typeface="Courier New" pitchFamily="49" charset="0"/>
+            </a:endParaRPr>
+          </a:p>
+        </p:txBody>
+      </p:sp>
+      <p:sp>
+        <p:nvSpPr>
+          <p:cNvPr id="64" name="Textfeld 63"/>
+          <p:cNvSpPr txBox="1"/>
+          <p:nvPr/>
+        </p:nvSpPr>
+        <p:spPr>
+          <a:xfrm>
+            <a:off x="4655289" y="3856029"/>
+            <a:ext cx="322524" cy="369332"/>
+          </a:xfrm>
+          <a:prstGeom prst="rect">
+            <a:avLst/>
+          </a:prstGeom>
+          <a:noFill/>
+        </p:spPr>
+        <p:txBody>
+          <a:bodyPr wrap="none" rtlCol="0">
+            <a:spAutoFit/>
+          </a:bodyPr>
+          <a:lstStyle/>
+          <a:p>
+            <a:r>
+              <a:rPr lang="de-DE" dirty="0" smtClean="0">
+                <a:solidFill>
+                  <a:srgbClr val="00B050"/>
+                </a:solidFill>
+                <a:latin typeface="Courier New" pitchFamily="49" charset="0"/>
+                <a:cs typeface="Courier New" pitchFamily="49" charset="0"/>
+              </a:rPr>
+              <a:t>z</a:t>
+            </a:r>
+            <a:endParaRPr lang="de-DE" dirty="0">
+              <a:solidFill>
+                <a:srgbClr val="00B050"/>
+              </a:solidFill>
+              <a:latin typeface="Courier New" pitchFamily="49" charset="0"/>
+              <a:cs typeface="Courier New" pitchFamily="49" charset="0"/>
+            </a:endParaRPr>
+          </a:p>
+        </p:txBody>
+      </p:sp>
+      <p:cxnSp>
+        <p:nvCxnSpPr>
+          <p:cNvPr id="52" name="Gerade Verbindung mit Pfeil 51"/>
+          <p:cNvCxnSpPr/>
+          <p:nvPr/>
+        </p:nvCxnSpPr>
+        <p:spPr>
+          <a:xfrm rot="1800000">
+            <a:off x="3537168" y="5353676"/>
+            <a:ext cx="936104" cy="1588"/>
+          </a:xfrm>
+          <a:prstGeom prst="straightConnector1">
+            <a:avLst/>
+          </a:prstGeom>
+          <a:ln w="19050">
+            <a:solidFill>
+              <a:schemeClr val="tx1"/>
+            </a:solidFill>
+            <a:headEnd type="arrow" w="med" len="med"/>
+            <a:tailEnd type="arrow" w="med" len="med"/>
+          </a:ln>
+        </p:spPr>
+        <p:style>
+          <a:lnRef idx="1">
+            <a:schemeClr val="accent1"/>
+          </a:lnRef>
+          <a:fillRef idx="0">
+            <a:schemeClr val="accent1"/>
+          </a:fillRef>
+          <a:effectRef idx="0">
+            <a:schemeClr val="accent1"/>
+          </a:effectRef>
+          <a:fontRef idx="minor">
+            <a:schemeClr val="tx1"/>
+          </a:fontRef>
+        </p:style>
+      </p:cxnSp>
+      <p:cxnSp>
+        <p:nvCxnSpPr>
+          <p:cNvPr id="75" name="Gerade Verbindung 74"/>
+          <p:cNvCxnSpPr/>
+          <p:nvPr/>
+        </p:nvCxnSpPr>
+        <p:spPr>
+          <a:xfrm>
+            <a:off x="3419872" y="4293096"/>
+            <a:ext cx="3438782" cy="0"/>
+          </a:xfrm>
+          <a:prstGeom prst="line">
+            <a:avLst/>
+          </a:prstGeom>
+          <a:ln w="12700">
+            <a:solidFill>
+              <a:schemeClr val="tx1"/>
+            </a:solidFill>
+            <a:prstDash val="dash"/>
+          </a:ln>
+        </p:spPr>
+        <p:style>
+          <a:lnRef idx="1">
+            <a:schemeClr val="accent1"/>
+          </a:lnRef>
+          <a:fillRef idx="0">
+            <a:schemeClr val="accent1"/>
+          </a:fillRef>
+          <a:effectRef idx="0">
+            <a:schemeClr val="accent1"/>
+          </a:effectRef>
+          <a:fontRef idx="minor">
+            <a:schemeClr val="tx1"/>
+          </a:fontRef>
+        </p:style>
+      </p:cxnSp>
+      <p:cxnSp>
+        <p:nvCxnSpPr>
+          <p:cNvPr id="19" name="Gerade Verbindung 18"/>
+          <p:cNvCxnSpPr/>
+          <p:nvPr/>
+        </p:nvCxnSpPr>
+        <p:spPr>
+          <a:xfrm>
+            <a:off x="3442732" y="4293096"/>
+            <a:ext cx="1851663" cy="0"/>
+          </a:xfrm>
+          <a:prstGeom prst="line">
+            <a:avLst/>
+          </a:prstGeom>
+          <a:ln w="19050">
+            <a:solidFill>
+              <a:schemeClr val="tx1">
+                <a:lumMod val="50000"/>
+                <a:lumOff val="50000"/>
+              </a:schemeClr>
+            </a:solidFill>
+          </a:ln>
+        </p:spPr>
+        <p:style>
+          <a:lnRef idx="1">
+            <a:schemeClr val="accent1"/>
+          </a:lnRef>
+          <a:fillRef idx="0">
+            <a:schemeClr val="accent1"/>
+          </a:fillRef>
+          <a:effectRef idx="0">
+            <a:schemeClr val="accent1"/>
+          </a:effectRef>
+          <a:fontRef idx="minor">
+            <a:schemeClr val="tx1"/>
+          </a:fontRef>
+        </p:style>
+      </p:cxnSp>
+      <p:cxnSp>
+        <p:nvCxnSpPr>
+          <p:cNvPr id="105" name="Gerade Verbindung 104"/>
+          <p:cNvCxnSpPr/>
+          <p:nvPr/>
+        </p:nvCxnSpPr>
+        <p:spPr>
+          <a:xfrm>
+            <a:off x="3442732" y="4298411"/>
+            <a:ext cx="645813" cy="944926"/>
+          </a:xfrm>
+          <a:prstGeom prst="line">
+            <a:avLst/>
+          </a:prstGeom>
+          <a:ln w="12700">
+            <a:solidFill>
+              <a:schemeClr val="tx1">
+                <a:lumMod val="50000"/>
+                <a:lumOff val="50000"/>
+              </a:schemeClr>
+            </a:solidFill>
+            <a:prstDash val="dash"/>
+          </a:ln>
+        </p:spPr>
+        <p:style>
+          <a:lnRef idx="1">
+            <a:schemeClr val="accent1"/>
+          </a:lnRef>
+          <a:fillRef idx="0">
+            <a:schemeClr val="accent1"/>
+          </a:fillRef>
+          <a:effectRef idx="0">
+            <a:schemeClr val="accent1"/>
+          </a:effectRef>
+          <a:fontRef idx="minor">
+            <a:schemeClr val="tx1"/>
+          </a:fontRef>
+        </p:style>
+      </p:cxnSp>
+      <p:cxnSp>
+        <p:nvCxnSpPr>
+          <p:cNvPr id="61" name="Gerade Verbindung mit Pfeil 60"/>
+          <p:cNvCxnSpPr/>
+          <p:nvPr/>
+        </p:nvCxnSpPr>
+        <p:spPr>
+          <a:xfrm flipV="1">
+            <a:off x="4483853" y="3443560"/>
+            <a:ext cx="0" cy="1014332"/>
+          </a:xfrm>
+          <a:prstGeom prst="straightConnector1">
+            <a:avLst/>
+          </a:prstGeom>
+          <a:ln w="12700">
+            <a:solidFill>
+              <a:schemeClr val="accent6">
+                <a:lumMod val="75000"/>
+              </a:schemeClr>
+            </a:solidFill>
+            <a:prstDash val="dash"/>
+            <a:headEnd type="none" w="med" len="med"/>
+            <a:tailEnd type="none" w="med" len="med"/>
+          </a:ln>
+        </p:spPr>
+        <p:style>
+          <a:lnRef idx="1">
+            <a:schemeClr val="accent1"/>
+          </a:lnRef>
+          <a:fillRef idx="0">
+            <a:schemeClr val="accent1"/>
+          </a:fillRef>
+          <a:effectRef idx="0">
+            <a:schemeClr val="accent1"/>
+          </a:effectRef>
+          <a:fontRef idx="minor">
+            <a:schemeClr val="tx1"/>
+          </a:fontRef>
+        </p:style>
+      </p:cxnSp>
+      <p:cxnSp>
+        <p:nvCxnSpPr>
+          <p:cNvPr id="62" name="Gerade Verbindung mit Pfeil 61"/>
+          <p:cNvCxnSpPr/>
+          <p:nvPr/>
+        </p:nvCxnSpPr>
+        <p:spPr>
+          <a:xfrm flipV="1">
+            <a:off x="3672448" y="3443560"/>
+            <a:ext cx="0" cy="527133"/>
+          </a:xfrm>
+          <a:prstGeom prst="straightConnector1">
+            <a:avLst/>
+          </a:prstGeom>
+          <a:ln w="12700">
+            <a:solidFill>
+              <a:schemeClr val="accent6">
+                <a:lumMod val="75000"/>
+              </a:schemeClr>
+            </a:solidFill>
+            <a:prstDash val="dash"/>
+            <a:headEnd type="none" w="med" len="med"/>
+            <a:tailEnd type="none" w="med" len="med"/>
+          </a:ln>
+        </p:spPr>
+        <p:style>
+          <a:lnRef idx="1">
+            <a:schemeClr val="accent1"/>
+          </a:lnRef>
+          <a:fillRef idx="0">
+            <a:schemeClr val="accent1"/>
+          </a:fillRef>
+          <a:effectRef idx="0">
+            <a:schemeClr val="accent1"/>
+          </a:effectRef>
+          <a:fontRef idx="minor">
+            <a:schemeClr val="tx1"/>
+          </a:fontRef>
+        </p:style>
+      </p:cxnSp>
+      <p:cxnSp>
+        <p:nvCxnSpPr>
+          <p:cNvPr id="63" name="Gerade Verbindung mit Pfeil 62"/>
+          <p:cNvCxnSpPr/>
+          <p:nvPr/>
+        </p:nvCxnSpPr>
+        <p:spPr>
+          <a:xfrm flipV="1">
+            <a:off x="4085673" y="3443562"/>
+            <a:ext cx="0" cy="781372"/>
+          </a:xfrm>
+          <a:prstGeom prst="straightConnector1">
+            <a:avLst/>
+          </a:prstGeom>
+          <a:ln w="12700">
+            <a:solidFill>
+              <a:schemeClr val="accent6">
+                <a:lumMod val="75000"/>
+              </a:schemeClr>
+            </a:solidFill>
+            <a:prstDash val="dash"/>
+            <a:headEnd type="none" w="med" len="med"/>
+            <a:tailEnd type="none" w="med" len="med"/>
+          </a:ln>
+        </p:spPr>
+        <p:style>
+          <a:lnRef idx="1">
+            <a:schemeClr val="accent1"/>
+          </a:lnRef>
+          <a:fillRef idx="0">
+            <a:schemeClr val="accent1"/>
+          </a:fillRef>
+          <a:effectRef idx="0">
+            <a:schemeClr val="accent1"/>
+          </a:effectRef>
+          <a:fontRef idx="minor">
+            <a:schemeClr val="tx1"/>
+          </a:fontRef>
+        </p:style>
+      </p:cxnSp>
+      <p:cxnSp>
+        <p:nvCxnSpPr>
+          <p:cNvPr id="49" name="Gerade Verbindung mit Pfeil 48"/>
+          <p:cNvCxnSpPr/>
+          <p:nvPr/>
+        </p:nvCxnSpPr>
+        <p:spPr>
+          <a:xfrm flipV="1">
+            <a:off x="4483058" y="4458319"/>
+            <a:ext cx="794" cy="936104"/>
+          </a:xfrm>
+          <a:prstGeom prst="straightConnector1">
+            <a:avLst/>
+          </a:prstGeom>
+          <a:ln w="28575">
+            <a:solidFill>
+              <a:schemeClr val="accent6">
+                <a:lumMod val="75000"/>
+              </a:schemeClr>
+            </a:solidFill>
+            <a:tailEnd type="arrow"/>
+          </a:ln>
+        </p:spPr>
+        <p:style>
+          <a:lnRef idx="1">
+            <a:schemeClr val="accent1"/>
+          </a:lnRef>
+          <a:fillRef idx="0">
+            <a:schemeClr val="accent1"/>
+          </a:fillRef>
+          <a:effectRef idx="0">
+            <a:schemeClr val="accent1"/>
+          </a:effectRef>
+          <a:fontRef idx="minor">
+            <a:schemeClr val="tx1"/>
+          </a:fontRef>
+        </p:style>
+      </p:cxnSp>
+      <p:cxnSp>
+        <p:nvCxnSpPr>
+          <p:cNvPr id="50" name="Gerade Verbindung mit Pfeil 49"/>
+          <p:cNvCxnSpPr/>
+          <p:nvPr/>
+        </p:nvCxnSpPr>
+        <p:spPr>
+          <a:xfrm flipV="1">
+            <a:off x="3671653" y="3979159"/>
+            <a:ext cx="1588" cy="936104"/>
+          </a:xfrm>
+          <a:prstGeom prst="straightConnector1">
+            <a:avLst/>
+          </a:prstGeom>
+          <a:ln w="28575">
+            <a:solidFill>
+              <a:schemeClr val="accent6">
+                <a:lumMod val="75000"/>
+              </a:schemeClr>
+            </a:solidFill>
+            <a:tailEnd type="arrow"/>
+          </a:ln>
+        </p:spPr>
+        <p:style>
+          <a:lnRef idx="1">
+            <a:schemeClr val="accent1"/>
+          </a:lnRef>
+          <a:fillRef idx="0">
+            <a:schemeClr val="accent1"/>
+          </a:fillRef>
+          <a:effectRef idx="0">
+            <a:schemeClr val="accent1"/>
+          </a:effectRef>
+          <a:fontRef idx="minor">
+            <a:schemeClr val="tx1"/>
+          </a:fontRef>
+        </p:style>
+      </p:cxnSp>
+      <p:cxnSp>
+        <p:nvCxnSpPr>
+          <p:cNvPr id="51" name="Gerade Verbindung mit Pfeil 50"/>
+          <p:cNvCxnSpPr/>
+          <p:nvPr/>
+        </p:nvCxnSpPr>
+        <p:spPr>
+          <a:xfrm flipV="1">
+            <a:off x="4084878" y="4225361"/>
+            <a:ext cx="1588" cy="936104"/>
+          </a:xfrm>
+          <a:prstGeom prst="straightConnector1">
+            <a:avLst/>
+          </a:prstGeom>
+          <a:ln w="28575">
+            <a:solidFill>
+              <a:schemeClr val="accent6">
+                <a:lumMod val="75000"/>
+              </a:schemeClr>
+            </a:solidFill>
+            <a:tailEnd type="arrow"/>
+          </a:ln>
+        </p:spPr>
+        <p:style>
+          <a:lnRef idx="1">
+            <a:schemeClr val="accent1"/>
+          </a:lnRef>
+          <a:fillRef idx="0">
+            <a:schemeClr val="accent1"/>
+          </a:fillRef>
+          <a:effectRef idx="0">
+            <a:schemeClr val="accent1"/>
+          </a:effectRef>
+          <a:fontRef idx="minor">
+            <a:schemeClr val="tx1"/>
+          </a:fontRef>
+        </p:style>
+      </p:cxnSp>
+      <p:cxnSp>
+        <p:nvCxnSpPr>
+          <p:cNvPr id="109" name="Gerade Verbindung 108"/>
+          <p:cNvCxnSpPr/>
+          <p:nvPr/>
+        </p:nvCxnSpPr>
+        <p:spPr>
+          <a:xfrm flipV="1">
+            <a:off x="4083184" y="4293096"/>
+            <a:ext cx="1206351" cy="927760"/>
+          </a:xfrm>
+          <a:prstGeom prst="line">
+            <a:avLst/>
+          </a:prstGeom>
+          <a:ln w="12700">
+            <a:solidFill>
+              <a:schemeClr val="tx1">
+                <a:lumMod val="50000"/>
+                <a:lumOff val="50000"/>
+              </a:schemeClr>
+            </a:solidFill>
+            <a:prstDash val="dash"/>
+          </a:ln>
+        </p:spPr>
+        <p:style>
+          <a:lnRef idx="1">
+            <a:schemeClr val="accent1"/>
+          </a:lnRef>
+          <a:fillRef idx="0">
+            <a:schemeClr val="accent1"/>
+          </a:fillRef>
+          <a:effectRef idx="0">
+            <a:schemeClr val="accent1"/>
+          </a:effectRef>
+          <a:fontRef idx="minor">
+            <a:schemeClr val="tx1"/>
+          </a:fontRef>
+        </p:style>
+      </p:cxnSp>
+      <p:cxnSp>
+        <p:nvCxnSpPr>
+          <p:cNvPr id="112" name="Gerade Verbindung 111"/>
+          <p:cNvCxnSpPr/>
+          <p:nvPr/>
+        </p:nvCxnSpPr>
+        <p:spPr>
+          <a:xfrm flipH="1">
+            <a:off x="4477133" y="4312116"/>
+            <a:ext cx="1095854" cy="1140768"/>
+          </a:xfrm>
+          <a:prstGeom prst="line">
+            <a:avLst/>
+          </a:prstGeom>
+          <a:ln w="12700">
+            <a:solidFill>
+              <a:srgbClr val="3333FF"/>
+            </a:solidFill>
+            <a:prstDash val="dashDot"/>
+          </a:ln>
+        </p:spPr>
+        <p:style>
+          <a:lnRef idx="1">
+            <a:schemeClr val="accent1"/>
+          </a:lnRef>
+          <a:fillRef idx="0">
+            <a:schemeClr val="accent1"/>
+          </a:fillRef>
+          <a:effectRef idx="0">
+            <a:schemeClr val="accent1"/>
+          </a:effectRef>
+          <a:fontRef idx="minor">
+            <a:schemeClr val="tx1"/>
+          </a:fontRef>
+        </p:style>
+      </p:cxnSp>
+      <p:cxnSp>
+        <p:nvCxnSpPr>
+          <p:cNvPr id="115" name="Gerade Verbindung 114"/>
+          <p:cNvCxnSpPr/>
+          <p:nvPr/>
+        </p:nvCxnSpPr>
+        <p:spPr>
+          <a:xfrm>
+            <a:off x="3563888" y="4315392"/>
+            <a:ext cx="908147" cy="1143174"/>
+          </a:xfrm>
+          <a:prstGeom prst="line">
+            <a:avLst/>
+          </a:prstGeom>
+          <a:ln w="12700">
+            <a:solidFill>
+              <a:srgbClr val="3333FF"/>
+            </a:solidFill>
+            <a:prstDash val="dashDot"/>
+          </a:ln>
+        </p:spPr>
+        <p:style>
+          <a:lnRef idx="1">
+            <a:schemeClr val="accent1"/>
+          </a:lnRef>
+          <a:fillRef idx="0">
+            <a:schemeClr val="accent1"/>
+          </a:fillRef>
+          <a:effectRef idx="0">
+            <a:schemeClr val="accent1"/>
+          </a:effectRef>
+          <a:fontRef idx="minor">
+            <a:schemeClr val="tx1"/>
+          </a:fontRef>
+        </p:style>
+      </p:cxnSp>
+      <p:cxnSp>
+        <p:nvCxnSpPr>
+          <p:cNvPr id="55" name="Gerade Verbindung mit Pfeil 54"/>
+          <p:cNvCxnSpPr/>
+          <p:nvPr/>
+        </p:nvCxnSpPr>
+        <p:spPr>
+          <a:xfrm>
+            <a:off x="4644405" y="3443560"/>
+            <a:ext cx="398" cy="849536"/>
+          </a:xfrm>
+          <a:prstGeom prst="straightConnector1">
+            <a:avLst/>
+          </a:prstGeom>
+          <a:ln w="38100">
+            <a:solidFill>
+              <a:srgbClr val="00B050"/>
+            </a:solidFill>
+            <a:headEnd type="none" w="med" len="med"/>
+            <a:tailEnd type="arrow" w="sm" len="sm"/>
+          </a:ln>
+        </p:spPr>
+        <p:style>
+          <a:lnRef idx="1">
+            <a:schemeClr val="accent1"/>
+          </a:lnRef>
+          <a:fillRef idx="0">
+            <a:schemeClr val="accent1"/>
+          </a:fillRef>
+          <a:effectRef idx="0">
+            <a:schemeClr val="accent1"/>
+          </a:effectRef>
+          <a:fontRef idx="minor">
+            <a:schemeClr val="tx1"/>
+          </a:fontRef>
+        </p:style>
+      </p:cxnSp>
+      <p:cxnSp>
+        <p:nvCxnSpPr>
+          <p:cNvPr id="118" name="Gerade Verbindung 117"/>
+          <p:cNvCxnSpPr/>
+          <p:nvPr/>
+        </p:nvCxnSpPr>
+        <p:spPr>
+          <a:xfrm>
+            <a:off x="3300809" y="4296471"/>
+            <a:ext cx="367299" cy="698831"/>
+          </a:xfrm>
+          <a:prstGeom prst="line">
+            <a:avLst/>
+          </a:prstGeom>
+          <a:ln w="12700">
+            <a:solidFill>
+              <a:srgbClr val="FF0000"/>
+            </a:solidFill>
+            <a:prstDash val="dash"/>
+          </a:ln>
+        </p:spPr>
+        <p:style>
+          <a:lnRef idx="1">
+            <a:schemeClr val="accent1"/>
+          </a:lnRef>
+          <a:fillRef idx="0">
+            <a:schemeClr val="accent1"/>
+          </a:fillRef>
+          <a:effectRef idx="0">
+            <a:schemeClr val="accent1"/>
+          </a:effectRef>
+          <a:fontRef idx="minor">
+            <a:schemeClr val="tx1"/>
+          </a:fontRef>
+        </p:style>
+      </p:cxnSp>
+      <p:cxnSp>
+        <p:nvCxnSpPr>
+          <p:cNvPr id="121" name="Gerade Verbindung 120"/>
+          <p:cNvCxnSpPr/>
+          <p:nvPr/>
+        </p:nvCxnSpPr>
+        <p:spPr>
+          <a:xfrm flipH="1">
+            <a:off x="3685045" y="4308336"/>
+            <a:ext cx="1186027" cy="681980"/>
+          </a:xfrm>
+          <a:prstGeom prst="line">
+            <a:avLst/>
+          </a:prstGeom>
+          <a:ln w="12700">
+            <a:solidFill>
+              <a:srgbClr val="FF0000"/>
+            </a:solidFill>
+            <a:prstDash val="dash"/>
+          </a:ln>
+        </p:spPr>
+        <p:style>
+          <a:lnRef idx="1">
+            <a:schemeClr val="accent1"/>
+          </a:lnRef>
+          <a:fillRef idx="0">
+            <a:schemeClr val="accent1"/>
+          </a:fillRef>
+          <a:effectRef idx="0">
+            <a:schemeClr val="accent1"/>
+          </a:effectRef>
+          <a:fontRef idx="minor">
+            <a:schemeClr val="tx1"/>
+          </a:fontRef>
+        </p:style>
+      </p:cxnSp>
+      <p:sp>
+        <p:nvSpPr>
+          <p:cNvPr id="8" name="Ellipse 7"/>
+          <p:cNvSpPr/>
+          <p:nvPr/>
+        </p:nvSpPr>
+        <p:spPr>
+          <a:xfrm>
+            <a:off x="4402111" y="5390854"/>
+            <a:ext cx="144016" cy="144016"/>
+          </a:xfrm>
+          <a:prstGeom prst="ellipse">
+            <a:avLst/>
+          </a:prstGeom>
+          <a:solidFill>
+            <a:schemeClr val="tx2">
+              <a:lumMod val="60000"/>
+              <a:lumOff val="40000"/>
+            </a:schemeClr>
+          </a:solidFill>
+          <a:ln>
+            <a:solidFill>
+              <a:schemeClr val="tx2"/>
+            </a:solidFill>
+          </a:ln>
+        </p:spPr>
+        <p:style>
+          <a:lnRef idx="2">
+            <a:schemeClr val="accent1">
+              <a:shade val="50000"/>
+            </a:schemeClr>
+          </a:lnRef>
+          <a:fillRef idx="1">
+            <a:schemeClr val="accent1"/>
+          </a:fillRef>
+          <a:effectRef idx="0">
+            <a:schemeClr val="accent1"/>
+          </a:effectRef>
+          <a:fontRef idx="minor">
+            <a:schemeClr val="lt1"/>
+          </a:fontRef>
+        </p:style>
+        <p:txBody>
+          <a:bodyPr rtlCol="0" anchor="ctr"/>
+          <a:lstStyle/>
+          <a:p>
+            <a:pPr algn="ctr"/>
+            <a:endParaRPr lang="de-DE"/>
+          </a:p>
+        </p:txBody>
+      </p:sp>
+      <p:sp>
+        <p:nvSpPr>
+          <p:cNvPr id="9" name="Ellipse 8"/>
+          <p:cNvSpPr/>
+          <p:nvPr/>
+        </p:nvSpPr>
+        <p:spPr>
+          <a:xfrm>
+            <a:off x="3601881" y="4930125"/>
+            <a:ext cx="144016" cy="144016"/>
+          </a:xfrm>
+          <a:prstGeom prst="ellipse">
+            <a:avLst/>
+          </a:prstGeom>
+          <a:solidFill>
+            <a:schemeClr val="accent2"/>
+          </a:solidFill>
+          <a:ln>
+            <a:solidFill>
+              <a:schemeClr val="accent2">
+                <a:lumMod val="50000"/>
+              </a:schemeClr>
+            </a:solidFill>
+          </a:ln>
+        </p:spPr>
+        <p:style>
+          <a:lnRef idx="2">
+            <a:schemeClr val="accent1">
+              <a:shade val="50000"/>
+            </a:schemeClr>
+          </a:lnRef>
+          <a:fillRef idx="1">
+            <a:schemeClr val="accent1"/>
+          </a:fillRef>
+          <a:effectRef idx="0">
+            <a:schemeClr val="accent1"/>
+          </a:effectRef>
+          <a:fontRef idx="minor">
+            <a:schemeClr val="lt1"/>
+          </a:fontRef>
+        </p:style>
+        <p:txBody>
+          <a:bodyPr rtlCol="0" anchor="ctr"/>
+          <a:lstStyle/>
+          <a:p>
+            <a:pPr algn="ctr"/>
+            <a:endParaRPr lang="de-DE"/>
+          </a:p>
+        </p:txBody>
+      </p:sp>
+      <p:cxnSp>
+        <p:nvCxnSpPr>
+          <p:cNvPr id="100" name="Gerade Verbindung mit Pfeil 99"/>
+          <p:cNvCxnSpPr/>
+          <p:nvPr/>
+        </p:nvCxnSpPr>
+        <p:spPr>
+          <a:xfrm rot="1800000">
+            <a:off x="3608792" y="5233885"/>
+            <a:ext cx="936104" cy="1588"/>
+          </a:xfrm>
+          <a:prstGeom prst="straightConnector1">
+            <a:avLst/>
+          </a:prstGeom>
+          <a:ln w="38100">
+            <a:solidFill>
+              <a:schemeClr val="accent4"/>
+            </a:solidFill>
+            <a:headEnd type="none" w="med" len="med"/>
+            <a:tailEnd type="arrow" w="sm" len="sm"/>
+          </a:ln>
+        </p:spPr>
+        <p:style>
+          <a:lnRef idx="1">
+            <a:schemeClr val="accent1"/>
+          </a:lnRef>
+          <a:fillRef idx="0">
+            <a:schemeClr val="accent1"/>
+          </a:fillRef>
+          <a:effectRef idx="0">
+            <a:schemeClr val="accent1"/>
+          </a:effectRef>
+          <a:fontRef idx="minor">
+            <a:schemeClr val="tx1"/>
+          </a:fontRef>
+        </p:style>
+      </p:cxnSp>
+      <p:sp>
+        <p:nvSpPr>
+          <p:cNvPr id="4" name="Ellipse 3"/>
+          <p:cNvSpPr/>
+          <p:nvPr/>
+        </p:nvSpPr>
+        <p:spPr>
+          <a:xfrm>
+            <a:off x="4004836" y="5163297"/>
+            <a:ext cx="144016" cy="144016"/>
+          </a:xfrm>
+          <a:prstGeom prst="ellipse">
+            <a:avLst/>
+          </a:prstGeom>
+          <a:solidFill>
+            <a:schemeClr val="bg1">
+              <a:lumMod val="50000"/>
+            </a:schemeClr>
+          </a:solidFill>
+          <a:ln>
+            <a:solidFill>
+              <a:schemeClr val="tx1">
+                <a:lumMod val="65000"/>
+                <a:lumOff val="35000"/>
+              </a:schemeClr>
+            </a:solidFill>
+          </a:ln>
+        </p:spPr>
+        <p:style>
+          <a:lnRef idx="2">
+            <a:schemeClr val="accent1">
+              <a:shade val="50000"/>
+            </a:schemeClr>
+          </a:lnRef>
+          <a:fillRef idx="1">
+            <a:schemeClr val="accent1"/>
+          </a:fillRef>
+          <a:effectRef idx="0">
+            <a:schemeClr val="accent1"/>
+          </a:effectRef>
+          <a:fontRef idx="minor">
+            <a:schemeClr val="lt1"/>
+          </a:fontRef>
+        </p:style>
+        <p:txBody>
+          <a:bodyPr rtlCol="0" anchor="ctr"/>
+          <a:lstStyle/>
+          <a:p>
+            <a:pPr algn="ctr"/>
+            <a:endParaRPr lang="de-DE"/>
+          </a:p>
+        </p:txBody>
+      </p:sp>
+    </p:spTree>
+    <p:extLst>
+      <p:ext uri="{BB962C8B-B14F-4D97-AF65-F5344CB8AC3E}">
+        <p14:creationId xmlns:p14="http://schemas.microsoft.com/office/powerpoint/2010/main" val="1744055577"/>
+      </p:ext>
+    </p:extLst>
+  </p:cSld>
+  <p:clrMapOvr>
+    <a:masterClrMapping/>
+  </p:clrMapOvr>
+  <p:timing>
+    <p:tnLst>
+      <p:par>
+        <p:cTn id="1" dur="indefinite" restart="never" nodeType="tmRoot"/>
+      </p:par>
+    </p:tnLst>
+  </p:timing>
+</p:sld>
+</file>
+
+<file path=ppt/slides/slide4.xml><?xml version="1.0" encoding="utf-8"?>
+<p:sld xmlns:a="http://schemas.openxmlformats.org/drawingml/2006/main" xmlns:r="http://schemas.openxmlformats.org/officeDocument/2006/relationships" xmlns:p="http://schemas.openxmlformats.org/presentationml/2006/main">
+  <p:cSld>
+    <p:spTree>
+      <p:nvGrpSpPr>
+        <p:cNvPr id="1" name=""/>
+        <p:cNvGrpSpPr/>
+        <p:nvPr/>
+      </p:nvGrpSpPr>
+      <p:grpSpPr>
+        <a:xfrm>
+          <a:off x="0" y="0"/>
+          <a:ext cx="0" cy="0"/>
+          <a:chOff x="0" y="0"/>
+          <a:chExt cx="0" cy="0"/>
+        </a:xfrm>
+      </p:grpSpPr>
       <p:pic>
         <p:nvPicPr>
           <p:cNvPr id="2" name="Grafik 1" descr="illum_convenient_tbb.png"/>
@@ -5873,7 +7701,7 @@
 </p:sld>
 </file>
 
-<file path=ppt/slides/slide4.xml><?xml version="1.0" encoding="utf-8"?>
+<file path=ppt/slides/slide5.xml><?xml version="1.0" encoding="utf-8"?>
 <p:sld xmlns:a="http://schemas.openxmlformats.org/drawingml/2006/main" xmlns:r="http://schemas.openxmlformats.org/officeDocument/2006/relationships" xmlns:p="http://schemas.openxmlformats.org/presentationml/2006/main">
   <p:cSld>
     <p:spTree>

</xml_diff>